<commit_message>
Add date to PowerPoint Template
</commit_message>
<xml_diff>
--- a/_extensions/govuk/DHSC-PPT-template.pptx
+++ b/_extensions/govuk/DHSC-PPT-template.pptx
@@ -646,10 +646,10 @@
       </p:sp>
       <p:sp>
         <p:nvSpPr>
-          <p:cNvPr id="11" name="Text Placeholder 10">
-            <a:extLst>
-              <a:ext uri="{FF2B5EF4-FFF2-40B4-BE49-F238E27FC236}">
-                <a16:creationId xmlns:a16="http://schemas.microsoft.com/office/drawing/2014/main" id="{7AFDDB99-4A42-4713-B148-1FC5187A0930}"/>
+          <p:cNvPr id="6" name="Date Placeholder 3">
+            <a:extLst>
+              <a:ext uri="{FF2B5EF4-FFF2-40B4-BE49-F238E27FC236}">
+                <a16:creationId xmlns:a16="http://schemas.microsoft.com/office/drawing/2014/main" id="{6427862F-E230-6147-674A-1265B5B95F02}"/>
               </a:ext>
             </a:extLst>
           </p:cNvPr>
@@ -657,63 +657,36 @@
             <a:spLocks noGrp="1"/>
           </p:cNvSpPr>
           <p:nvPr>
-            <p:ph type="body" sz="quarter" idx="13" hasCustomPrompt="1"/>
+            <p:ph type="dt" sz="half" idx="2"/>
           </p:nvPr>
         </p:nvSpPr>
         <p:spPr>
           <a:xfrm>
-            <a:off x="697706" y="4230443"/>
-            <a:ext cx="3043238" cy="237757"/>
+            <a:off x="697706" y="4194356"/>
+            <a:ext cx="2133600" cy="273844"/>
           </a:xfrm>
+          <a:prstGeom prst="rect">
+            <a:avLst/>
+          </a:prstGeom>
         </p:spPr>
         <p:txBody>
-          <a:bodyPr anchor="b" anchorCtr="0">
-            <a:spAutoFit/>
-          </a:bodyPr>
+          <a:bodyPr vert="horz" lIns="91440" tIns="45720" rIns="91440" bIns="45720" rtlCol="0" anchor="ctr"/>
           <a:lstStyle>
-            <a:lvl1pPr marL="0" marR="0" indent="0" algn="l" defTabSz="685800" rtl="0" eaLnBrk="1" fontAlgn="auto" latinLnBrk="0" hangingPunct="1">
-              <a:lnSpc>
-                <a:spcPct val="90000"/>
-              </a:lnSpc>
-              <a:spcBef>
-                <a:spcPts val="750"/>
-              </a:spcBef>
-              <a:spcAft>
-                <a:spcPts val="0"/>
-              </a:spcAft>
-              <a:buClrTx/>
-              <a:buSzTx/>
-              <a:buFont typeface="Arial" panose="020B0604020202020204" pitchFamily="34" charset="0"/>
-              <a:buNone/>
-              <a:tabLst/>
-              <a:defRPr sz="1050" b="0">
-                <a:latin typeface="Arial" panose="020B0604020202020204" pitchFamily="34" charset="0"/>
-                <a:cs typeface="Arial" panose="020B0604020202020204" pitchFamily="34" charset="0"/>
+            <a:lvl1pPr algn="l">
+              <a:defRPr sz="1400">
+                <a:solidFill>
+                  <a:schemeClr val="tx1"/>
+                </a:solidFill>
               </a:defRPr>
             </a:lvl1pPr>
           </a:lstStyle>
           <a:p>
-            <a:pPr marL="0" marR="0" lvl="0" indent="0" algn="l" defTabSz="685800" rtl="0" eaLnBrk="1" fontAlgn="auto" latinLnBrk="0" hangingPunct="1">
-              <a:lnSpc>
-                <a:spcPct val="90000"/>
-              </a:lnSpc>
-              <a:spcBef>
-                <a:spcPts val="750"/>
-              </a:spcBef>
-              <a:spcAft>
-                <a:spcPts val="0"/>
-              </a:spcAft>
-              <a:buClrTx/>
-              <a:buSzTx/>
-              <a:buFont typeface="Arial" panose="020B0604020202020204" pitchFamily="34" charset="0"/>
-              <a:buNone/>
-              <a:tabLst/>
-              <a:defRPr/>
-            </a:pPr>
-            <a:r>
-              <a:rPr lang="en-GB" dirty="0"/>
-              <a:t>Published DD Month YYYY</a:t>
-            </a:r>
+            <a:fld id="{241EB5C9-1307-BA42-ABA2-0BC069CD8E7F}" type="datetimeFigureOut">
+              <a:rPr lang="en-US" smtClean="0"/>
+              <a:pPr/>
+              <a:t>5/19/2023</a:t>
+            </a:fld>
+            <a:endParaRPr lang="en-US" dirty="0"/>
           </a:p>
         </p:txBody>
       </p:sp>
@@ -7757,31 +7730,6 @@
           </p:cNvSpPr>
           <p:nvPr>
             <p:ph type="subTitle" idx="1"/>
-          </p:nvPr>
-        </p:nvSpPr>
-        <p:spPr/>
-        <p:txBody>
-          <a:bodyPr/>
-          <a:lstStyle/>
-          <a:p>
-            <a:endParaRPr lang="en-GB"/>
-          </a:p>
-        </p:txBody>
-      </p:sp>
-      <p:sp>
-        <p:nvSpPr>
-          <p:cNvPr id="4" name="Text Placeholder 3">
-            <a:extLst>
-              <a:ext uri="{FF2B5EF4-FFF2-40B4-BE49-F238E27FC236}">
-                <a16:creationId xmlns:a16="http://schemas.microsoft.com/office/drawing/2014/main" id="{F2B21C29-663C-A21D-8694-F3BD6F426DFC}"/>
-              </a:ext>
-            </a:extLst>
-          </p:cNvPr>
-          <p:cNvSpPr>
-            <a:spLocks noGrp="1"/>
-          </p:cNvSpPr>
-          <p:nvPr>
-            <p:ph type="body" sz="quarter" idx="13"/>
           </p:nvPr>
         </p:nvSpPr>
         <p:spPr/>

</xml_diff>